<commit_message>
background and fount color change
</commit_message>
<xml_diff>
--- a/Main_Project.pptx
+++ b/Main_Project.pptx
@@ -1319,12 +1319,12 @@
         </a:fontRef>
       </dsp:style>
       <dsp:txBody>
-        <a:bodyPr spcFirstLastPara="0" vert="horz" wrap="square" lIns="85344" tIns="85344" rIns="85344" bIns="85344" numCol="1" spcCol="1270" anchor="ctr" anchorCtr="0">
+        <a:bodyPr spcFirstLastPara="0" vert="horz" wrap="square" lIns="56896" tIns="56896" rIns="56896" bIns="56896" numCol="1" spcCol="1270" anchor="ctr" anchorCtr="0">
           <a:noAutofit/>
         </a:bodyPr>
         <a:lstStyle/>
         <a:p>
-          <a:pPr lvl="0" algn="ctr" defTabSz="533400">
+          <a:pPr lvl="0" algn="ctr" defTabSz="355600">
             <a:lnSpc>
               <a:spcPct val="90000"/>
             </a:lnSpc>
@@ -1336,10 +1336,10 @@
             </a:spcAft>
           </a:pPr>
           <a:r>
-            <a:rPr lang="en-US" sz="1200" kern="1200" dirty="0" smtClean="0"/>
+            <a:rPr lang="en-US" sz="800" kern="1200" dirty="0" smtClean="0"/>
             <a:t>Connect</a:t>
           </a:r>
-          <a:endParaRPr lang="en-US" sz="1200" kern="1200" dirty="0"/>
+          <a:endParaRPr lang="en-US" sz="800" kern="1200" dirty="0"/>
         </a:p>
       </dsp:txBody>
       <dsp:txXfrm rot="5400000">
@@ -1399,12 +1399,12 @@
         </a:fontRef>
       </dsp:style>
       <dsp:txBody>
-        <a:bodyPr spcFirstLastPara="0" vert="horz" wrap="square" lIns="85344" tIns="85344" rIns="85344" bIns="85344" numCol="1" spcCol="1270" anchor="ctr" anchorCtr="0">
+        <a:bodyPr spcFirstLastPara="0" vert="horz" wrap="square" lIns="56896" tIns="56896" rIns="56896" bIns="56896" numCol="1" spcCol="1270" anchor="ctr" anchorCtr="0">
           <a:noAutofit/>
         </a:bodyPr>
         <a:lstStyle/>
         <a:p>
-          <a:pPr lvl="0" algn="ctr" defTabSz="533400">
+          <a:pPr lvl="0" algn="ctr" defTabSz="355600">
             <a:lnSpc>
               <a:spcPct val="90000"/>
             </a:lnSpc>
@@ -1416,10 +1416,10 @@
             </a:spcAft>
           </a:pPr>
           <a:r>
-            <a:rPr lang="en-US" sz="1200" kern="1200" dirty="0" smtClean="0"/>
+            <a:rPr lang="en-US" sz="800" kern="1200" dirty="0" smtClean="0"/>
             <a:t>Communicate</a:t>
           </a:r>
-          <a:endParaRPr lang="en-US" sz="1200" kern="1200" dirty="0"/>
+          <a:endParaRPr lang="en-US" sz="800" kern="1200" dirty="0"/>
         </a:p>
       </dsp:txBody>
       <dsp:txXfrm rot="-5400000">
@@ -4137,14 +4137,6 @@
 <file path=ppt/slideLayouts/slideLayout1.xml><?xml version="1.0" encoding="utf-8"?>
 <p:sldLayout xmlns:a="http://schemas.openxmlformats.org/drawingml/2006/main" xmlns:r="http://schemas.openxmlformats.org/officeDocument/2006/relationships" xmlns:p="http://schemas.openxmlformats.org/presentationml/2006/main" matchingName="Title" type="title">
   <p:cSld name="TITLE">
-    <p:bg>
-      <p:bgPr>
-        <a:solidFill>
-          <a:srgbClr val="FE6594"/>
-        </a:solidFill>
-        <a:effectLst/>
-      </p:bgPr>
-    </p:bg>
     <p:spTree>
       <p:nvGrpSpPr>
         <p:cNvPr id="1" name="Shape 9"/>
@@ -10202,6 +10194,13 @@
   <p:clrMapOvr>
     <a:masterClrMapping/>
   </p:clrMapOvr>
+  <p:timing>
+    <p:tnLst>
+      <p:par>
+        <p:cTn id="1" dur="indefinite" restart="never" nodeType="tmRoot"/>
+      </p:par>
+    </p:tnLst>
+  </p:timing>
 </p:sldLayout>
 </file>
 
@@ -10253,7 +10252,11 @@
               </a:spcAft>
               <a:buSzPts val="3600"/>
               <a:buNone/>
-              <a:defRPr sz="3600"/>
+              <a:defRPr sz="3600">
+                <a:solidFill>
+                  <a:schemeClr val="bg1"/>
+                </a:solidFill>
+              </a:defRPr>
             </a:lvl1pPr>
             <a:lvl2pPr lvl="1" algn="ctr" rtl="0">
               <a:spcBef>
@@ -10345,7 +10348,7 @@
             </a:lvl9pPr>
           </a:lstStyle>
           <a:p>
-            <a:endParaRPr/>
+            <a:endParaRPr dirty="0"/>
           </a:p>
         </p:txBody>
       </p:sp>
@@ -16389,6 +16392,13 @@
   <p:clrMapOvr>
     <a:masterClrMapping/>
   </p:clrMapOvr>
+  <p:timing>
+    <p:tnLst>
+      <p:par>
+        <p:cTn id="1" dur="indefinite" restart="never" nodeType="tmRoot"/>
+      </p:par>
+    </p:tnLst>
+  </p:timing>
 </p:sldLayout>
 </file>
 
@@ -16440,7 +16450,11 @@
               </a:spcAft>
               <a:buSzPts val="3000"/>
               <a:buNone/>
-              <a:defRPr/>
+              <a:defRPr>
+                <a:solidFill>
+                  <a:schemeClr val="bg1"/>
+                </a:solidFill>
+              </a:defRPr>
             </a:lvl1pPr>
             <a:lvl2pPr lvl="1">
               <a:spcBef>
@@ -16532,7 +16546,7 @@
             </a:lvl9pPr>
           </a:lstStyle>
           <a:p>
-            <a:endParaRPr/>
+            <a:endParaRPr dirty="0"/>
           </a:p>
         </p:txBody>
       </p:sp>
@@ -16659,7 +16673,7 @@
             </a:lvl9pPr>
           </a:lstStyle>
           <a:p>
-            <a:endParaRPr/>
+            <a:endParaRPr dirty="0"/>
           </a:p>
         </p:txBody>
       </p:sp>
@@ -16786,7 +16800,7 @@
             </a:lvl9pPr>
           </a:lstStyle>
           <a:p>
-            <a:endParaRPr/>
+            <a:endParaRPr dirty="0"/>
           </a:p>
         </p:txBody>
       </p:sp>
@@ -16816,7 +16830,11 @@
           <a:lstStyle>
             <a:lvl1pPr lvl="0">
               <a:buNone/>
-              <a:defRPr/>
+              <a:defRPr>
+                <a:solidFill>
+                  <a:schemeClr val="bg1"/>
+                </a:solidFill>
+              </a:defRPr>
             </a:lvl1pPr>
             <a:lvl2pPr lvl="1">
               <a:buNone/>
@@ -16852,20 +16870,12 @@
             </a:lvl9pPr>
           </a:lstStyle>
           <a:p>
-            <a:pPr marL="0" lvl="0" indent="0" algn="ctr" rtl="0">
-              <a:spcBef>
-                <a:spcPts val="0"/>
-              </a:spcBef>
-              <a:spcAft>
-                <a:spcPts val="0"/>
-              </a:spcAft>
-              <a:buNone/>
-            </a:pPr>
             <a:fld id="{00000000-1234-1234-1234-123412341234}" type="slidenum">
-              <a:rPr lang="en"/>
+              <a:rPr lang="en" smtClean="0"/>
+              <a:pPr/>
               <a:t>‹#›</a:t>
             </a:fld>
-            <a:endParaRPr/>
+            <a:endParaRPr lang="en" dirty="0"/>
           </a:p>
         </p:txBody>
       </p:sp>
@@ -22526,6 +22536,13 @@
   <p:clrMapOvr>
     <a:masterClrMapping/>
   </p:clrMapOvr>
+  <p:timing>
+    <p:tnLst>
+      <p:par>
+        <p:cTn id="1" dur="indefinite" restart="never" nodeType="tmRoot"/>
+      </p:par>
+    </p:tnLst>
+  </p:timing>
 </p:sldLayout>
 </file>
 
@@ -22572,7 +22589,11 @@
           <a:lstStyle>
             <a:lvl1pPr lvl="0">
               <a:buNone/>
-              <a:defRPr/>
+              <a:defRPr>
+                <a:solidFill>
+                  <a:schemeClr val="bg1"/>
+                </a:solidFill>
+              </a:defRPr>
             </a:lvl1pPr>
             <a:lvl2pPr lvl="1">
               <a:buNone/>
@@ -22608,20 +22629,12 @@
             </a:lvl9pPr>
           </a:lstStyle>
           <a:p>
-            <a:pPr marL="0" lvl="0" indent="0" algn="ctr" rtl="0">
-              <a:spcBef>
-                <a:spcPts val="0"/>
-              </a:spcBef>
-              <a:spcAft>
-                <a:spcPts val="0"/>
-              </a:spcAft>
-              <a:buNone/>
-            </a:pPr>
             <a:fld id="{00000000-1234-1234-1234-123412341234}" type="slidenum">
-              <a:rPr lang="en"/>
+              <a:rPr lang="en" smtClean="0"/>
+              <a:pPr/>
               <a:t>‹#›</a:t>
             </a:fld>
-            <a:endParaRPr/>
+            <a:endParaRPr lang="en" dirty="0"/>
           </a:p>
         </p:txBody>
       </p:sp>
@@ -28282,20 +28295,19 @@
   <p:clrMapOvr>
     <a:masterClrMapping/>
   </p:clrMapOvr>
+  <p:timing>
+    <p:tnLst>
+      <p:par>
+        <p:cTn id="1" dur="indefinite" restart="never" nodeType="tmRoot"/>
+      </p:par>
+    </p:tnLst>
+  </p:timing>
 </p:sldLayout>
 </file>
 
 <file path=ppt/slideLayouts/slideLayout5.xml><?xml version="1.0" encoding="utf-8"?>
 <p:sldLayout xmlns:a="http://schemas.openxmlformats.org/drawingml/2006/main" xmlns:r="http://schemas.openxmlformats.org/officeDocument/2006/relationships" xmlns:p="http://schemas.openxmlformats.org/presentationml/2006/main" matchingName="Blank color background">
   <p:cSld name="BLANK_1">
-    <p:bg>
-      <p:bgPr>
-        <a:solidFill>
-          <a:srgbClr val="FE6594"/>
-        </a:solidFill>
-        <a:effectLst/>
-      </p:bgPr>
-    </p:bg>
     <p:spTree>
       <p:nvGrpSpPr>
         <p:cNvPr id="1" name="Shape 314"/>
@@ -34082,6 +34094,13 @@
   <p:clrMapOvr>
     <a:masterClrMapping/>
   </p:clrMapOvr>
+  <p:timing>
+    <p:tnLst>
+      <p:par>
+        <p:cTn id="1" dur="indefinite" restart="never" nodeType="tmRoot"/>
+      </p:par>
+    </p:tnLst>
+  </p:timing>
 </p:sldLayout>
 </file>
 
@@ -34091,7 +34110,7 @@
     <p:bg>
       <p:bgPr>
         <a:solidFill>
-          <a:schemeClr val="lt1"/>
+          <a:srgbClr val="4840E1"/>
         </a:solidFill>
         <a:effectLst/>
       </p:bgPr>
@@ -34345,7 +34364,7 @@
             </a:lvl9pPr>
           </a:lstStyle>
           <a:p>
-            <a:endParaRPr/>
+            <a:endParaRPr dirty="0"/>
           </a:p>
         </p:txBody>
       </p:sp>
@@ -34584,7 +34603,7 @@
             </a:lvl9pPr>
           </a:lstStyle>
           <a:p>
-            <a:endParaRPr/>
+            <a:endParaRPr dirty="0"/>
           </a:p>
         </p:txBody>
       </p:sp>
@@ -34756,6 +34775,13 @@
   <p:transition>
     <p:fade thruBlk="1"/>
   </p:transition>
+  <p:timing>
+    <p:tnLst>
+      <p:par>
+        <p:cTn id="1" dur="indefinite" restart="never" nodeType="tmRoot"/>
+      </p:par>
+    </p:tnLst>
+  </p:timing>
   <p:hf hdr="0" ftr="0" dt="0"/>
   <p:txStyles>
     <p:titleStyle>
@@ -34786,7 +34812,7 @@
         <a:buFont typeface="Arial"/>
         <a:defRPr sz="1400" b="0" i="0" u="none" strike="noStrike" cap="none">
           <a:solidFill>
-            <a:srgbClr val="000000"/>
+            <a:schemeClr val="bg1"/>
           </a:solidFill>
           <a:latin typeface="Arial"/>
           <a:ea typeface="Arial"/>
@@ -35601,7 +35627,7 @@
             <a:r>
               <a:rPr lang="en-US" dirty="0">
                 <a:solidFill>
-                  <a:srgbClr val="FE6594"/>
+                  <a:schemeClr val="bg1"/>
                 </a:solidFill>
                 <a:latin typeface="Microsoft PhagsPa" panose="020B0502040204020203" pitchFamily="34" charset="0"/>
                 <a:ea typeface="Pacifico"/>
@@ -35615,7 +35641,7 @@
             <a:r>
               <a:rPr lang="en-US" dirty="0">
                 <a:solidFill>
-                  <a:srgbClr val="FE6594"/>
+                  <a:schemeClr val="bg1"/>
                 </a:solidFill>
                 <a:latin typeface="Microsoft PhagsPa" panose="020B0502040204020203" pitchFamily="34" charset="0"/>
                 <a:ea typeface="Pacifico"/>
@@ -35629,7 +35655,7 @@
             <a:r>
               <a:rPr lang="en-US" dirty="0">
                 <a:solidFill>
-                  <a:srgbClr val="FE6594"/>
+                  <a:schemeClr val="bg1"/>
                 </a:solidFill>
                 <a:latin typeface="Microsoft PhagsPa" panose="020B0502040204020203" pitchFamily="34" charset="0"/>
                 <a:ea typeface="Pacifico"/>
@@ -35643,7 +35669,7 @@
             <a:r>
               <a:rPr lang="en-US" dirty="0">
                 <a:solidFill>
-                  <a:srgbClr val="FE6594"/>
+                  <a:schemeClr val="bg1"/>
                 </a:solidFill>
                 <a:latin typeface="Microsoft PhagsPa" panose="020B0502040204020203" pitchFamily="34" charset="0"/>
                 <a:ea typeface="Pacifico"/>
@@ -35657,7 +35683,7 @@
             <a:r>
               <a:rPr lang="en-US" dirty="0">
                 <a:solidFill>
-                  <a:srgbClr val="FE6594"/>
+                  <a:schemeClr val="bg1"/>
                 </a:solidFill>
                 <a:latin typeface="Microsoft PhagsPa" panose="020B0502040204020203" pitchFamily="34" charset="0"/>
                 <a:ea typeface="Pacifico"/>
@@ -35671,7 +35697,7 @@
             <a:r>
               <a:rPr lang="en-US" dirty="0">
                 <a:solidFill>
-                  <a:srgbClr val="FE6594"/>
+                  <a:schemeClr val="bg1"/>
                 </a:solidFill>
                 <a:latin typeface="Microsoft PhagsPa" panose="020B0502040204020203" pitchFamily="34" charset="0"/>
                 <a:ea typeface="Pacifico"/>
@@ -35682,7 +35708,7 @@
             <a:r>
               <a:rPr lang="en-US" dirty="0" smtClean="0">
                 <a:solidFill>
-                  <a:srgbClr val="FE6594"/>
+                  <a:schemeClr val="bg1"/>
                 </a:solidFill>
                 <a:latin typeface="Microsoft PhagsPa" panose="020B0502040204020203" pitchFamily="34" charset="0"/>
                 <a:ea typeface="Pacifico"/>
@@ -35692,7 +35718,7 @@
             </a:r>
             <a:endParaRPr lang="en-US" dirty="0">
               <a:solidFill>
-                <a:srgbClr val="FE6594"/>
+                <a:schemeClr val="bg1"/>
               </a:solidFill>
               <a:latin typeface="Microsoft PhagsPa" panose="020B0502040204020203" pitchFamily="34" charset="0"/>
               <a:ea typeface="Pacifico"/>
@@ -35704,7 +35730,7 @@
             <a:r>
               <a:rPr lang="en-US" dirty="0">
                 <a:solidFill>
-                  <a:srgbClr val="FE6594"/>
+                  <a:schemeClr val="bg1"/>
                 </a:solidFill>
                 <a:latin typeface="Microsoft PhagsPa" panose="020B0502040204020203" pitchFamily="34" charset="0"/>
                 <a:ea typeface="Pacifico"/>
@@ -35715,7 +35741,7 @@
             <a:r>
               <a:rPr lang="en-US" dirty="0" smtClean="0">
                 <a:solidFill>
-                  <a:srgbClr val="FE6594"/>
+                  <a:schemeClr val="bg1"/>
                 </a:solidFill>
                 <a:latin typeface="Microsoft PhagsPa" panose="020B0502040204020203" pitchFamily="34" charset="0"/>
                 <a:ea typeface="Pacifico"/>
@@ -35725,7 +35751,7 @@
             </a:r>
             <a:endParaRPr lang="en-US" dirty="0">
               <a:solidFill>
-                <a:srgbClr val="FE6594"/>
+                <a:schemeClr val="bg1"/>
               </a:solidFill>
               <a:latin typeface="Microsoft PhagsPa" panose="020B0502040204020203" pitchFamily="34" charset="0"/>
               <a:ea typeface="Pacifico"/>
@@ -35758,7 +35784,7 @@
             <a:r>
               <a:rPr lang="en-US" dirty="0">
                 <a:solidFill>
-                  <a:srgbClr val="FE6594"/>
+                  <a:schemeClr val="bg1"/>
                 </a:solidFill>
                 <a:latin typeface="Microsoft PhagsPa" panose="020B0502040204020203" pitchFamily="34" charset="0"/>
                 <a:ea typeface="Pacifico"/>
@@ -35772,7 +35798,7 @@
             <a:r>
               <a:rPr lang="en-US" dirty="0">
                 <a:solidFill>
-                  <a:srgbClr val="FE6594"/>
+                  <a:schemeClr val="bg1"/>
                 </a:solidFill>
                 <a:latin typeface="Microsoft PhagsPa" panose="020B0502040204020203" pitchFamily="34" charset="0"/>
                 <a:ea typeface="Pacifico"/>
@@ -35786,7 +35812,7 @@
             <a:r>
               <a:rPr lang="en-US" dirty="0">
                 <a:solidFill>
-                  <a:srgbClr val="FE6594"/>
+                  <a:schemeClr val="bg1"/>
                 </a:solidFill>
                 <a:latin typeface="Microsoft PhagsPa" panose="020B0502040204020203" pitchFamily="34" charset="0"/>
                 <a:ea typeface="Pacifico"/>
@@ -35800,7 +35826,7 @@
             <a:r>
               <a:rPr lang="en-US" dirty="0">
                 <a:solidFill>
-                  <a:srgbClr val="FE6594"/>
+                  <a:schemeClr val="bg1"/>
                 </a:solidFill>
                 <a:latin typeface="Microsoft PhagsPa" panose="020B0502040204020203" pitchFamily="34" charset="0"/>
                 <a:ea typeface="Pacifico"/>
@@ -35814,7 +35840,7 @@
             <a:r>
               <a:rPr lang="en-US" dirty="0">
                 <a:solidFill>
-                  <a:srgbClr val="FE6594"/>
+                  <a:schemeClr val="bg1"/>
                 </a:solidFill>
                 <a:latin typeface="Microsoft PhagsPa" panose="020B0502040204020203" pitchFamily="34" charset="0"/>
                 <a:ea typeface="Pacifico"/>
@@ -35828,7 +35854,7 @@
             <a:r>
               <a:rPr lang="en-US" dirty="0">
                 <a:solidFill>
-                  <a:srgbClr val="FE6594"/>
+                  <a:schemeClr val="bg1"/>
                 </a:solidFill>
                 <a:latin typeface="Microsoft PhagsPa" panose="020B0502040204020203" pitchFamily="34" charset="0"/>
                 <a:ea typeface="Pacifico"/>
@@ -35839,7 +35865,7 @@
             <a:r>
               <a:rPr lang="en-US" dirty="0" smtClean="0">
                 <a:solidFill>
-                  <a:srgbClr val="FE6594"/>
+                  <a:schemeClr val="bg1"/>
                 </a:solidFill>
                 <a:latin typeface="Microsoft PhagsPa" panose="020B0502040204020203" pitchFamily="34" charset="0"/>
                 <a:ea typeface="Pacifico"/>
@@ -35849,7 +35875,7 @@
             </a:r>
             <a:endParaRPr lang="en-US" dirty="0">
               <a:solidFill>
-                <a:srgbClr val="FE6594"/>
+                <a:schemeClr val="bg1"/>
               </a:solidFill>
               <a:latin typeface="Microsoft PhagsPa" panose="020B0502040204020203" pitchFamily="34" charset="0"/>
               <a:ea typeface="Pacifico"/>
@@ -35861,7 +35887,7 @@
             <a:r>
               <a:rPr lang="en-US" dirty="0">
                 <a:solidFill>
-                  <a:srgbClr val="FE6594"/>
+                  <a:schemeClr val="bg1"/>
                 </a:solidFill>
                 <a:latin typeface="Microsoft PhagsPa" panose="020B0502040204020203" pitchFamily="34" charset="0"/>
                 <a:ea typeface="Pacifico"/>
@@ -35913,7 +35939,7 @@
               <a:rPr lang="en" smtClean="0"/>
               <a:t>10</a:t>
             </a:fld>
-            <a:endParaRPr lang="en"/>
+            <a:endParaRPr lang="en" dirty="0"/>
           </a:p>
         </p:txBody>
       </p:sp>
@@ -36011,29 +36037,18 @@
             <a:r>
               <a:rPr lang="en-US" sz="3600" dirty="0">
                 <a:solidFill>
-                  <a:srgbClr val="FE6594"/>
+                  <a:schemeClr val="bg1"/>
                 </a:solidFill>
                 <a:latin typeface="Microsoft PhagsPa" panose="020B0502040204020203" pitchFamily="34" charset="0"/>
                 <a:ea typeface="Pacifico"/>
                 <a:cs typeface="Pacifico"/>
               </a:rPr>
-              <a:t>In Pakistan </a:t>
-            </a:r>
-            <a:r>
-              <a:rPr lang="en-US" sz="3600" dirty="0">
-                <a:solidFill>
-                  <a:srgbClr val="FE6594"/>
-                </a:solidFill>
-                <a:latin typeface="Microsoft PhagsPa" panose="020B0502040204020203" pitchFamily="34" charset="0"/>
-                <a:ea typeface="Pacifico"/>
-                <a:cs typeface="Pacifico"/>
-              </a:rPr>
-              <a:t>30% of people live in </a:t>
+              <a:t>In Pakistan 30% of people live in </a:t>
             </a:r>
             <a:r>
               <a:rPr lang="en-US" sz="3600" dirty="0" smtClean="0">
                 <a:solidFill>
-                  <a:srgbClr val="FE6594"/>
+                  <a:schemeClr val="bg1"/>
                 </a:solidFill>
                 <a:latin typeface="Microsoft PhagsPa" panose="020B0502040204020203" pitchFamily="34" charset="0"/>
                 <a:ea typeface="Pacifico"/>
@@ -36044,7 +36059,7 @@
             <a:r>
               <a:rPr lang="en-US" sz="2800" dirty="0" smtClean="0">
                 <a:solidFill>
-                  <a:srgbClr val="FE6594"/>
+                  <a:schemeClr val="bg1"/>
                 </a:solidFill>
                 <a:latin typeface="Microsoft PhagsPa" panose="020B0502040204020203" pitchFamily="34" charset="0"/>
                 <a:ea typeface="Pacifico"/>
@@ -36053,13 +36068,17 @@
               <a:t>(</a:t>
             </a:r>
             <a:r>
-              <a:rPr lang="en-US" sz="2800" dirty="0"/>
+              <a:rPr lang="en-US" sz="2800" dirty="0">
+                <a:solidFill>
+                  <a:schemeClr val="bg1"/>
+                </a:solidFill>
+              </a:rPr>
               <a:t> </a:t>
             </a:r>
             <a:r>
               <a:rPr lang="en-US" sz="2800" dirty="0">
                 <a:solidFill>
-                  <a:srgbClr val="FE6594"/>
+                  <a:schemeClr val="bg1"/>
                 </a:solidFill>
                 <a:latin typeface="Microsoft PhagsPa" panose="020B0502040204020203" pitchFamily="34" charset="0"/>
                 <a:ea typeface="Pacifico"/>
@@ -36070,7 +36089,7 @@
             <a:r>
               <a:rPr lang="en-US" sz="2800" dirty="0" smtClean="0">
                 <a:solidFill>
-                  <a:srgbClr val="FE6594"/>
+                  <a:schemeClr val="bg1"/>
                 </a:solidFill>
                 <a:latin typeface="Microsoft PhagsPa" panose="020B0502040204020203" pitchFamily="34" charset="0"/>
                 <a:ea typeface="Pacifico"/>
@@ -36080,7 +36099,7 @@
             </a:r>
             <a:endParaRPr lang="en-US" sz="2800" dirty="0">
               <a:solidFill>
-                <a:srgbClr val="FE6594"/>
+                <a:schemeClr val="bg1"/>
               </a:solidFill>
               <a:latin typeface="Microsoft PhagsPa" panose="020B0502040204020203" pitchFamily="34" charset="0"/>
               <a:ea typeface="Pacifico"/>
@@ -36105,12 +36124,36 @@
         </p:blipFill>
         <p:spPr>
           <a:xfrm>
-            <a:off x="1595437" y="-13788"/>
+            <a:off x="1595437" y="97324"/>
             <a:ext cx="5953125" cy="3401122"/>
           </a:xfrm>
-          <a:prstGeom prst="rect">
-            <a:avLst/>
+          <a:prstGeom prst="roundRect">
+            <a:avLst>
+              <a:gd name="adj" fmla="val 16667"/>
+            </a:avLst>
           </a:prstGeom>
+          <a:ln>
+            <a:noFill/>
+          </a:ln>
+          <a:effectLst>
+            <a:outerShdw blurRad="76200" dist="38100" dir="7800000" algn="tl" rotWithShape="0">
+              <a:srgbClr val="000000">
+                <a:alpha val="40000"/>
+              </a:srgbClr>
+            </a:outerShdw>
+          </a:effectLst>
+          <a:scene3d>
+            <a:camera prst="orthographicFront"/>
+            <a:lightRig rig="contrasting" dir="t">
+              <a:rot lat="0" lon="0" rev="4200000"/>
+            </a:lightRig>
+          </a:scene3d>
+          <a:sp3d prstMaterial="plastic">
+            <a:bevelT w="381000" h="114300" prst="relaxedInset"/>
+            <a:contourClr>
+              <a:srgbClr val="969696"/>
+            </a:contourClr>
+          </a:sp3d>
         </p:spPr>
       </p:pic>
     </p:spTree>
@@ -36358,7 +36401,7 @@
             <a:r>
               <a:rPr lang="en-US" sz="2400" dirty="0">
                 <a:solidFill>
-                  <a:srgbClr val="FE6594"/>
+                  <a:schemeClr val="bg1"/>
                 </a:solidFill>
                 <a:latin typeface="Microsoft PhagsPa" panose="020B0502040204020203" pitchFamily="34" charset="0"/>
                 <a:ea typeface="Pacifico"/>
@@ -36370,7 +36413,7 @@
             <a:r>
               <a:rPr lang="en-US" sz="2400" dirty="0" smtClean="0">
                 <a:solidFill>
-                  <a:srgbClr val="FE6594"/>
+                  <a:schemeClr val="bg1"/>
                 </a:solidFill>
                 <a:latin typeface="Microsoft PhagsPa" panose="020B0502040204020203" pitchFamily="34" charset="0"/>
                 <a:ea typeface="Pacifico"/>
@@ -36382,7 +36425,7 @@
             <a:r>
               <a:rPr lang="en-US" sz="2400" dirty="0">
                 <a:solidFill>
-                  <a:srgbClr val="FE6594"/>
+                  <a:schemeClr val="bg1"/>
                 </a:solidFill>
                 <a:latin typeface="Microsoft PhagsPa" panose="020B0502040204020203" pitchFamily="34" charset="0"/>
                 <a:ea typeface="Pacifico"/>
@@ -36394,7 +36437,7 @@
             <a:r>
               <a:rPr lang="en-US" sz="2400" dirty="0" smtClean="0">
                 <a:solidFill>
-                  <a:srgbClr val="FE6594"/>
+                  <a:schemeClr val="bg1"/>
                 </a:solidFill>
                 <a:latin typeface="Microsoft PhagsPa" panose="020B0502040204020203" pitchFamily="34" charset="0"/>
                 <a:ea typeface="Pacifico"/>
@@ -36406,7 +36449,7 @@
             <a:r>
               <a:rPr lang="en-US" sz="2400" dirty="0">
                 <a:solidFill>
-                  <a:srgbClr val="FE6594"/>
+                  <a:schemeClr val="bg1"/>
                 </a:solidFill>
                 <a:latin typeface="Microsoft PhagsPa" panose="020B0502040204020203" pitchFamily="34" charset="0"/>
                 <a:ea typeface="Pacifico"/>
@@ -36563,7 +36606,7 @@
             <a:r>
               <a:rPr lang="en-US" sz="3600" dirty="0">
                 <a:solidFill>
-                  <a:srgbClr val="FE6594"/>
+                  <a:schemeClr val="bg1"/>
                 </a:solidFill>
                 <a:latin typeface="Microsoft PhagsPa" panose="020B0502040204020203" pitchFamily="34" charset="0"/>
                 <a:ea typeface="Pacifico"/>
@@ -36574,7 +36617,7 @@
             <a:r>
               <a:rPr lang="en-US" sz="3600" dirty="0" smtClean="0">
                 <a:solidFill>
-                  <a:srgbClr val="FE6594"/>
+                  <a:schemeClr val="bg1"/>
                 </a:solidFill>
                 <a:latin typeface="Microsoft PhagsPa" panose="020B0502040204020203" pitchFamily="34" charset="0"/>
                 <a:ea typeface="Pacifico"/>
@@ -36584,7 +36627,7 @@
             </a:r>
             <a:endParaRPr lang="en-US" sz="3600" dirty="0">
               <a:solidFill>
-                <a:srgbClr val="FE6594"/>
+                <a:schemeClr val="bg1"/>
               </a:solidFill>
               <a:latin typeface="Microsoft PhagsPa" panose="020B0502040204020203" pitchFamily="34" charset="0"/>
               <a:ea typeface="Pacifico"/>
@@ -36813,7 +36856,7 @@
             <a:r>
               <a:rPr lang="en-US" sz="2400" dirty="0" smtClean="0">
                 <a:solidFill>
-                  <a:srgbClr val="FE6594"/>
+                  <a:schemeClr val="bg1"/>
                 </a:solidFill>
                 <a:latin typeface="Microsoft PhagsPa" panose="020B0502040204020203" pitchFamily="34" charset="0"/>
                 <a:ea typeface="Pacifico"/>
@@ -36823,7 +36866,7 @@
             </a:r>
             <a:endParaRPr lang="en-US" sz="2400" dirty="0">
               <a:solidFill>
-                <a:srgbClr val="FE6594"/>
+                <a:schemeClr val="bg1"/>
               </a:solidFill>
               <a:latin typeface="Microsoft PhagsPa" panose="020B0502040204020203" pitchFamily="34" charset="0"/>
               <a:ea typeface="Pacifico"/>
@@ -36856,7 +36899,7 @@
             <a:r>
               <a:rPr lang="en-US" sz="1800" dirty="0" smtClean="0">
                 <a:solidFill>
-                  <a:srgbClr val="FE6594"/>
+                  <a:schemeClr val="bg1"/>
                 </a:solidFill>
                 <a:latin typeface="Microsoft PhagsPa" panose="020B0502040204020203" pitchFamily="34" charset="0"/>
                 <a:ea typeface="Pacifico"/>
@@ -36864,7 +36907,11 @@
               </a:rPr>
               <a:t>Jamie Feldman</a:t>
             </a:r>
-            <a:endParaRPr lang="en-US" sz="1800" dirty="0"/>
+            <a:endParaRPr lang="en-US" sz="1800" dirty="0">
+              <a:solidFill>
+                <a:schemeClr val="bg1"/>
+              </a:solidFill>
+            </a:endParaRPr>
           </a:p>
         </p:txBody>
       </p:sp>
@@ -37002,7 +37049,7 @@
             <a:r>
               <a:rPr lang="en-US" sz="2400" dirty="0">
                 <a:solidFill>
-                  <a:srgbClr val="FE6594"/>
+                  <a:schemeClr val="bg1"/>
                 </a:solidFill>
                 <a:latin typeface="Microsoft PhagsPa" panose="020B0502040204020203" pitchFamily="34" charset="0"/>
                 <a:ea typeface="Pacifico"/>
@@ -37014,7 +37061,7 @@
             <a:r>
               <a:rPr lang="en-US" sz="2400" dirty="0" smtClean="0">
                 <a:solidFill>
-                  <a:srgbClr val="FE6594"/>
+                  <a:schemeClr val="bg1"/>
                 </a:solidFill>
                 <a:latin typeface="Microsoft PhagsPa" panose="020B0502040204020203" pitchFamily="34" charset="0"/>
                 <a:ea typeface="Pacifico"/>
@@ -37027,7 +37074,7 @@
           <a:p>
             <a:endParaRPr lang="en-US" sz="2400" dirty="0">
               <a:solidFill>
-                <a:srgbClr val="FE6594"/>
+                <a:schemeClr val="bg1"/>
               </a:solidFill>
               <a:latin typeface="Microsoft PhagsPa" panose="020B0502040204020203" pitchFamily="34" charset="0"/>
               <a:ea typeface="Pacifico"/>
@@ -37039,7 +37086,7 @@
             <a:r>
               <a:rPr lang="en-US" sz="2400" dirty="0">
                 <a:solidFill>
-                  <a:srgbClr val="FE6594"/>
+                  <a:schemeClr val="bg1"/>
                 </a:solidFill>
                 <a:latin typeface="Microsoft PhagsPa" panose="020B0502040204020203" pitchFamily="34" charset="0"/>
                 <a:ea typeface="Pacifico"/>
@@ -37051,7 +37098,7 @@
             <a:r>
               <a:rPr lang="en-US" sz="2400" dirty="0" smtClean="0">
                 <a:solidFill>
-                  <a:srgbClr val="FE6594"/>
+                  <a:schemeClr val="bg1"/>
                 </a:solidFill>
                 <a:latin typeface="Microsoft PhagsPa" panose="020B0502040204020203" pitchFamily="34" charset="0"/>
                 <a:ea typeface="Pacifico"/>
@@ -37064,7 +37111,7 @@
           <a:p>
             <a:endParaRPr lang="en-US" sz="2400" dirty="0">
               <a:solidFill>
-                <a:srgbClr val="FE6594"/>
+                <a:schemeClr val="bg1"/>
               </a:solidFill>
               <a:latin typeface="Microsoft PhagsPa" panose="020B0502040204020203" pitchFamily="34" charset="0"/>
               <a:ea typeface="Pacifico"/>
@@ -37076,7 +37123,7 @@
             <a:r>
               <a:rPr lang="en-US" sz="2400" dirty="0">
                 <a:solidFill>
-                  <a:srgbClr val="FE6594"/>
+                  <a:schemeClr val="bg1"/>
                 </a:solidFill>
                 <a:latin typeface="Microsoft PhagsPa" panose="020B0502040204020203" pitchFamily="34" charset="0"/>
                 <a:ea typeface="Pacifico"/>
@@ -37281,7 +37328,7 @@
             <a:r>
               <a:rPr lang="en-US" sz="2800" dirty="0">
                 <a:solidFill>
-                  <a:srgbClr val="FE6594"/>
+                  <a:schemeClr val="bg1"/>
                 </a:solidFill>
                 <a:latin typeface="Microsoft PhagsPa" panose="020B0502040204020203" pitchFamily="34" charset="0"/>
                 <a:ea typeface="Pacifico"/>
@@ -37342,7 +37389,7 @@
             <a:r>
               <a:rPr lang="en-US" sz="2400" dirty="0">
                 <a:solidFill>
-                  <a:srgbClr val="FE6594"/>
+                  <a:schemeClr val="bg1"/>
                 </a:solidFill>
                 <a:latin typeface="Microsoft PhagsPa" panose="020B0502040204020203" pitchFamily="34" charset="0"/>
                 <a:ea typeface="Pacifico"/>
@@ -37425,10 +37472,18 @@
               <a:buNone/>
             </a:pPr>
             <a:r>
-              <a:rPr lang="en" sz="6000" dirty="0"/>
+              <a:rPr lang="en" sz="6000" dirty="0">
+                <a:solidFill>
+                  <a:schemeClr val="bg1"/>
+                </a:solidFill>
+              </a:rPr>
               <a:t>Hello!</a:t>
             </a:r>
-            <a:endParaRPr sz="6000" dirty="0"/>
+            <a:endParaRPr sz="6000" dirty="0">
+              <a:solidFill>
+                <a:schemeClr val="bg1"/>
+              </a:solidFill>
+            </a:endParaRPr>
           </a:p>
         </p:txBody>
       </p:sp>
@@ -37469,7 +37524,7 @@
             <a:r>
               <a:rPr lang="en" b="1" dirty="0">
                 <a:solidFill>
-                  <a:srgbClr val="4CC3F8"/>
+                  <a:schemeClr val="bg1"/>
                 </a:solidFill>
               </a:rPr>
               <a:t>I am </a:t>
@@ -37477,14 +37532,14 @@
             <a:r>
               <a:rPr lang="en" b="1" dirty="0" smtClean="0">
                 <a:solidFill>
-                  <a:srgbClr val="4CC3F8"/>
+                  <a:schemeClr val="bg1"/>
                 </a:solidFill>
               </a:rPr>
               <a:t>Hassan Malik</a:t>
             </a:r>
             <a:endParaRPr b="1" dirty="0">
               <a:solidFill>
-                <a:srgbClr val="4CC3F8"/>
+                <a:schemeClr val="bg1"/>
               </a:solidFill>
             </a:endParaRPr>
           </a:p>
@@ -37504,7 +37559,11 @@
               <a:buNone/>
             </a:pPr>
             <a:r>
-              <a:rPr lang="en" dirty="0" smtClean="0"/>
+              <a:rPr lang="en" dirty="0" smtClean="0">
+                <a:solidFill>
+                  <a:schemeClr val="bg1"/>
+                </a:solidFill>
+              </a:rPr>
               <a:t>I am here to present an idea of donation like app. But it’s not just an donation app it’s more than that.</a:t>
             </a:r>
           </a:p>
@@ -37614,7 +37673,7 @@
             <a:r>
               <a:rPr lang="en-US" dirty="0">
                 <a:solidFill>
-                  <a:srgbClr val="627281"/>
+                  <a:schemeClr val="bg1"/>
                 </a:solidFill>
                 <a:latin typeface="Roboto Slab Light"/>
                 <a:ea typeface="Roboto Slab Light"/>
@@ -37659,7 +37718,7 @@
             <a:r>
               <a:rPr lang="en" sz="1200" b="1" dirty="0" smtClean="0">
                 <a:solidFill>
-                  <a:srgbClr val="4CC3F8"/>
+                  <a:schemeClr val="bg1"/>
                 </a:solidFill>
                 <a:latin typeface="Roboto Slab Light"/>
                 <a:ea typeface="Roboto Slab Light"/>
@@ -37671,7 +37730,7 @@
             <a:r>
               <a:rPr lang="en" sz="1200" b="1" dirty="0">
                 <a:solidFill>
-                  <a:srgbClr val="4CC3F8"/>
+                  <a:schemeClr val="bg1"/>
                 </a:solidFill>
                 <a:latin typeface="Roboto Slab Light"/>
                 <a:ea typeface="Roboto Slab Light"/>
@@ -37683,7 +37742,7 @@
             <a:r>
               <a:rPr lang="en" sz="1200" b="1" dirty="0">
                 <a:solidFill>
-                  <a:srgbClr val="4CC3F8"/>
+                  <a:schemeClr val="bg1"/>
                 </a:solidFill>
                 <a:latin typeface="Roboto Slab Light"/>
                 <a:ea typeface="Roboto Slab Light"/>
@@ -37896,12 +37955,42 @@
         </p:blipFill>
         <p:spPr>
           <a:xfrm>
-            <a:off x="-25491" y="1312333"/>
-            <a:ext cx="6642474" cy="3774920"/>
+            <a:off x="83494" y="1339582"/>
+            <a:ext cx="6596294" cy="3748676"/>
           </a:xfrm>
           <a:prstGeom prst="rect">
             <a:avLst/>
           </a:prstGeom>
+          <a:solidFill>
+            <a:srgbClr val="FFFFFF">
+              <a:shade val="85000"/>
+            </a:srgbClr>
+          </a:solidFill>
+          <a:ln w="190500" cap="sq">
+            <a:solidFill>
+              <a:srgbClr val="FFFFFF"/>
+            </a:solidFill>
+            <a:miter lim="800000"/>
+          </a:ln>
+          <a:effectLst>
+            <a:outerShdw blurRad="55000" dist="18000" dir="5400000" algn="tl" rotWithShape="0">
+              <a:srgbClr val="000000">
+                <a:alpha val="40000"/>
+              </a:srgbClr>
+            </a:outerShdw>
+          </a:effectLst>
+          <a:scene3d>
+            <a:camera prst="orthographicFront"/>
+            <a:lightRig rig="twoPt" dir="t">
+              <a:rot lat="0" lon="0" rev="7200000"/>
+            </a:lightRig>
+          </a:scene3d>
+          <a:sp3d>
+            <a:bevelT w="25400" h="19050"/>
+            <a:contourClr>
+              <a:srgbClr val="FFFFFF"/>
+            </a:contourClr>
+          </a:sp3d>
         </p:spPr>
       </p:pic>
       <p:sp>
@@ -37937,7 +38026,7 @@
             <a:r>
               <a:rPr lang="en-US" sz="1800" b="1" dirty="0">
                 <a:solidFill>
-                  <a:srgbClr val="0070C0"/>
+                  <a:schemeClr val="bg1"/>
                 </a:solidFill>
                 <a:latin typeface="Roboto Slab Light"/>
                 <a:ea typeface="Roboto Slab Light"/>
@@ -37973,7 +38062,7 @@
             <a:r>
               <a:rPr lang="en-US" sz="1800" b="1" dirty="0">
                 <a:solidFill>
-                  <a:srgbClr val="0070C0"/>
+                  <a:schemeClr val="bg1"/>
                 </a:solidFill>
                 <a:latin typeface="Roboto Slab Light"/>
                 <a:ea typeface="Roboto Slab Light"/>
@@ -38017,7 +38106,7 @@
             <a:r>
               <a:rPr lang="en-US" sz="1800" b="1" dirty="0">
                 <a:solidFill>
-                  <a:srgbClr val="0070C0"/>
+                  <a:schemeClr val="bg1"/>
                 </a:solidFill>
                 <a:latin typeface="Roboto Slab Light"/>
                 <a:ea typeface="Roboto Slab Light"/>
@@ -38052,7 +38141,7 @@
             <a:r>
               <a:rPr lang="en-US" sz="1800" b="1" dirty="0">
                 <a:solidFill>
-                  <a:srgbClr val="0070C0"/>
+                  <a:schemeClr val="bg1"/>
                 </a:solidFill>
                 <a:latin typeface="Roboto Slab Light"/>
                 <a:ea typeface="Roboto Slab Light"/>
@@ -38063,7 +38152,7 @@
             <a:r>
               <a:rPr lang="en-US" sz="1800" b="1" dirty="0" smtClean="0">
                 <a:solidFill>
-                  <a:srgbClr val="0070C0"/>
+                  <a:schemeClr val="bg1"/>
                 </a:solidFill>
                 <a:latin typeface="Roboto Slab Light"/>
                 <a:ea typeface="Roboto Slab Light"/>
@@ -38073,7 +38162,7 @@
             </a:r>
             <a:endParaRPr lang="en-US" sz="1800" b="1" dirty="0">
               <a:solidFill>
-                <a:srgbClr val="0070C0"/>
+                <a:schemeClr val="bg1"/>
               </a:solidFill>
               <a:latin typeface="Roboto Slab Light"/>
               <a:ea typeface="Roboto Slab Light"/>
@@ -38107,7 +38196,7 @@
             <a:r>
               <a:rPr lang="en-US" sz="1800" dirty="0">
                 <a:solidFill>
-                  <a:srgbClr val="FE6594"/>
+                  <a:schemeClr val="bg1"/>
                 </a:solidFill>
                 <a:latin typeface="Microsoft Sans Serif" panose="020B0604020202020204" pitchFamily="34" charset="0"/>
                 <a:ea typeface="Microsoft Sans Serif" panose="020B0604020202020204" pitchFamily="34" charset="0"/>
@@ -38118,7 +38207,7 @@
             <a:r>
               <a:rPr lang="en-US" sz="1800" dirty="0" smtClean="0">
                 <a:solidFill>
-                  <a:srgbClr val="FE6594"/>
+                  <a:schemeClr val="bg1"/>
                 </a:solidFill>
                 <a:latin typeface="Microsoft Sans Serif" panose="020B0604020202020204" pitchFamily="34" charset="0"/>
                 <a:ea typeface="Microsoft Sans Serif" panose="020B0604020202020204" pitchFamily="34" charset="0"/>
@@ -38129,7 +38218,7 @@
             <a:r>
               <a:rPr lang="en-US" sz="1800" dirty="0">
                 <a:solidFill>
-                  <a:srgbClr val="FE6594"/>
+                  <a:schemeClr val="bg1"/>
                 </a:solidFill>
                 <a:latin typeface="Microsoft Sans Serif" panose="020B0604020202020204" pitchFamily="34" charset="0"/>
                 <a:ea typeface="Microsoft Sans Serif" panose="020B0604020202020204" pitchFamily="34" charset="0"/>
@@ -38165,7 +38254,7 @@
             <a:r>
               <a:rPr lang="en-US" sz="2400" dirty="0">
                 <a:solidFill>
-                  <a:srgbClr val="FE6594"/>
+                  <a:schemeClr val="bg1"/>
                 </a:solidFill>
                 <a:latin typeface="Microsoft Sans Serif" panose="020B0604020202020204" pitchFamily="34" charset="0"/>
                 <a:ea typeface="Microsoft Sans Serif" panose="020B0604020202020204" pitchFamily="34" charset="0"/>
@@ -38177,7 +38266,7 @@
             <a:r>
               <a:rPr lang="en-US" sz="2400" dirty="0" smtClean="0">
                 <a:solidFill>
-                  <a:srgbClr val="FE6594"/>
+                  <a:schemeClr val="bg1"/>
                 </a:solidFill>
                 <a:latin typeface="Microsoft Sans Serif" panose="020B0604020202020204" pitchFamily="34" charset="0"/>
                 <a:ea typeface="Microsoft Sans Serif" panose="020B0604020202020204" pitchFamily="34" charset="0"/>
@@ -38188,7 +38277,7 @@
             </a:r>
             <a:endParaRPr lang="en-US" sz="2400" dirty="0">
               <a:solidFill>
-                <a:srgbClr val="FE6594"/>
+                <a:schemeClr val="bg1"/>
               </a:solidFill>
               <a:latin typeface="Microsoft Sans Serif" panose="020B0604020202020204" pitchFamily="34" charset="0"/>
               <a:ea typeface="Microsoft Sans Serif" panose="020B0604020202020204" pitchFamily="34" charset="0"/>
@@ -38263,7 +38352,7 @@
               <a:rPr lang="en" smtClean="0"/>
               <a:t>22</a:t>
             </a:fld>
-            <a:endParaRPr lang="en"/>
+            <a:endParaRPr lang="en" dirty="0"/>
           </a:p>
         </p:txBody>
       </p:sp>
@@ -38326,6 +38415,26 @@
             <a:avLst/>
           </a:prstGeom>
           <a:noFill/>
+          <a:ln>
+            <a:solidFill>
+              <a:schemeClr val="accent1"/>
+            </a:solidFill>
+          </a:ln>
+          <a:effectLst>
+            <a:glow rad="228600">
+              <a:schemeClr val="accent1">
+                <a:satMod val="175000"/>
+                <a:alpha val="40000"/>
+              </a:schemeClr>
+            </a:glow>
+          </a:effectLst>
+          <a:scene3d>
+            <a:camera prst="orthographicFront"/>
+            <a:lightRig rig="threePt" dir="t"/>
+          </a:scene3d>
+          <a:sp3d>
+            <a:bevelT w="101600" prst="riblet"/>
+          </a:sp3d>
           <a:extLst>
             <a:ext uri="{909E8E84-426E-40DD-AFC4-6F175D3DCCD1}">
               <a14:hiddenFill xmlns:a14="http://schemas.microsoft.com/office/drawing/2010/main">
@@ -38391,6 +38500,26 @@
             <a:avLst/>
           </a:prstGeom>
           <a:noFill/>
+          <a:ln>
+            <a:solidFill>
+              <a:schemeClr val="accent1"/>
+            </a:solidFill>
+          </a:ln>
+          <a:effectLst>
+            <a:glow rad="228600">
+              <a:schemeClr val="accent1">
+                <a:satMod val="175000"/>
+                <a:alpha val="40000"/>
+              </a:schemeClr>
+            </a:glow>
+          </a:effectLst>
+          <a:scene3d>
+            <a:camera prst="orthographicFront"/>
+            <a:lightRig rig="threePt" dir="t"/>
+          </a:scene3d>
+          <a:sp3d>
+            <a:bevelT w="101600" prst="riblet"/>
+          </a:sp3d>
           <a:extLst>
             <a:ext uri="{909E8E84-426E-40DD-AFC4-6F175D3DCCD1}">
               <a14:hiddenFill xmlns:a14="http://schemas.microsoft.com/office/drawing/2010/main">
@@ -38637,7 +38766,7 @@
             <a:r>
               <a:rPr lang="en-US" sz="4000" dirty="0">
                 <a:solidFill>
-                  <a:srgbClr val="FE6594"/>
+                  <a:schemeClr val="bg1"/>
                 </a:solidFill>
                 <a:latin typeface="Microsoft PhagsPa" panose="020B0502040204020203" pitchFamily="34" charset="0"/>
                 <a:ea typeface="Pacifico"/>
@@ -38647,7 +38776,7 @@
             </a:r>
             <a:endParaRPr lang="en-US" sz="4000" dirty="0">
               <a:solidFill>
-                <a:srgbClr val="FE6594"/>
+                <a:schemeClr val="bg1"/>
               </a:solidFill>
               <a:latin typeface="Microsoft PhagsPa" panose="020B0502040204020203" pitchFamily="34" charset="0"/>
               <a:ea typeface="Pacifico"/>
@@ -38746,7 +38875,7 @@
               <a:rPr lang="en" smtClean="0"/>
               <a:t>25</a:t>
             </a:fld>
-            <a:endParaRPr lang="en"/>
+            <a:endParaRPr lang="en" dirty="0"/>
           </a:p>
         </p:txBody>
       </p:sp>
@@ -38774,7 +38903,7 @@
             <a:r>
               <a:rPr lang="en-US" sz="2400" dirty="0">
                 <a:solidFill>
-                  <a:srgbClr val="FE6594"/>
+                  <a:schemeClr val="bg1"/>
                 </a:solidFill>
                 <a:latin typeface="Microsoft PhagsPa" panose="020B0502040204020203" pitchFamily="34" charset="0"/>
                 <a:ea typeface="Pacifico"/>
@@ -38791,7 +38920,7 @@
             <a:r>
               <a:rPr lang="en-US" sz="2400" dirty="0">
                 <a:solidFill>
-                  <a:srgbClr val="FE6594"/>
+                  <a:schemeClr val="bg1"/>
                 </a:solidFill>
                 <a:latin typeface="Microsoft PhagsPa" panose="020B0502040204020203" pitchFamily="34" charset="0"/>
                 <a:ea typeface="Pacifico"/>
@@ -38808,7 +38937,7 @@
             <a:r>
               <a:rPr lang="en-US" sz="2400" dirty="0">
                 <a:solidFill>
-                  <a:srgbClr val="FE6594"/>
+                  <a:schemeClr val="bg1"/>
                 </a:solidFill>
                 <a:latin typeface="Microsoft PhagsPa" panose="020B0502040204020203" pitchFamily="34" charset="0"/>
                 <a:ea typeface="Pacifico"/>
@@ -38825,7 +38954,7 @@
             <a:r>
               <a:rPr lang="en-US" sz="2400" dirty="0">
                 <a:solidFill>
-                  <a:srgbClr val="FE6594"/>
+                  <a:schemeClr val="bg1"/>
                 </a:solidFill>
                 <a:latin typeface="Microsoft PhagsPa" panose="020B0502040204020203" pitchFamily="34" charset="0"/>
                 <a:ea typeface="Pacifico"/>
@@ -38842,7 +38971,7 @@
             <a:r>
               <a:rPr lang="en-US" sz="2400" dirty="0">
                 <a:solidFill>
-                  <a:srgbClr val="FE6594"/>
+                  <a:schemeClr val="bg1"/>
                 </a:solidFill>
                 <a:latin typeface="Microsoft PhagsPa" panose="020B0502040204020203" pitchFamily="34" charset="0"/>
                 <a:ea typeface="Pacifico"/>
@@ -38951,7 +39080,7 @@
         </p:nvSpPr>
         <p:spPr>
           <a:xfrm>
-            <a:off x="5374889" y="4018385"/>
+            <a:off x="5374889" y="4066309"/>
             <a:ext cx="2681868" cy="635618"/>
           </a:xfrm>
         </p:spPr>
@@ -39009,12 +39138,13 @@
         </p:nvSpPr>
         <p:spPr>
           <a:xfrm>
-            <a:off x="1384717" y="2968431"/>
+            <a:off x="1384716" y="3112202"/>
             <a:ext cx="6374565" cy="954107"/>
           </a:xfrm>
           <a:prstGeom prst="rect">
             <a:avLst/>
           </a:prstGeom>
+          <a:noFill/>
         </p:spPr>
         <p:txBody>
           <a:bodyPr wrap="square">
@@ -39031,7 +39161,7 @@
             <a:r>
               <a:rPr lang="en-US" sz="2800" dirty="0">
                 <a:solidFill>
-                  <a:srgbClr val="FE6594"/>
+                  <a:schemeClr val="bg1"/>
                 </a:solidFill>
                 <a:latin typeface="Microsoft PhagsPa" panose="020B0502040204020203" pitchFamily="34" charset="0"/>
                 <a:ea typeface="Pacifico"/>
@@ -39042,7 +39172,7 @@
             <a:r>
               <a:rPr lang="en-US" sz="2800" dirty="0" smtClean="0">
                 <a:solidFill>
-                  <a:srgbClr val="FE6594"/>
+                  <a:schemeClr val="bg1"/>
                 </a:solidFill>
                 <a:latin typeface="Microsoft PhagsPa" panose="020B0502040204020203" pitchFamily="34" charset="0"/>
                 <a:ea typeface="Pacifico"/>
@@ -39052,7 +39182,7 @@
             </a:r>
             <a:endParaRPr lang="en-US" sz="2800" dirty="0">
               <a:solidFill>
-                <a:srgbClr val="FE6594"/>
+                <a:schemeClr val="bg1"/>
               </a:solidFill>
               <a:latin typeface="Microsoft PhagsPa" panose="020B0502040204020203" pitchFamily="34" charset="0"/>
               <a:ea typeface="Pacifico"/>
@@ -39078,12 +39208,36 @@
         </p:blipFill>
         <p:spPr>
           <a:xfrm>
-            <a:off x="2888468" y="607267"/>
-            <a:ext cx="3130597" cy="2160442"/>
+            <a:off x="2824985" y="353590"/>
+            <a:ext cx="3494028" cy="2411248"/>
           </a:xfrm>
-          <a:prstGeom prst="rect">
+          <a:prstGeom prst="ellipse">
             <a:avLst/>
           </a:prstGeom>
+          <a:ln w="63500" cap="rnd">
+            <a:solidFill>
+              <a:srgbClr val="333333"/>
+            </a:solidFill>
+          </a:ln>
+          <a:effectLst>
+            <a:outerShdw blurRad="381000" dist="292100" dir="5400000" sx="-80000" sy="-18000" rotWithShape="0">
+              <a:srgbClr val="000000">
+                <a:alpha val="22000"/>
+              </a:srgbClr>
+            </a:outerShdw>
+          </a:effectLst>
+          <a:scene3d>
+            <a:camera prst="orthographicFront"/>
+            <a:lightRig rig="contrasting" dir="t">
+              <a:rot lat="0" lon="0" rev="3000000"/>
+            </a:lightRig>
+          </a:scene3d>
+          <a:sp3d contourW="7620">
+            <a:bevelT w="95250" h="31750"/>
+            <a:contourClr>
+              <a:srgbClr val="333333"/>
+            </a:contourClr>
+          </a:sp3d>
         </p:spPr>
       </p:pic>
     </p:spTree>
@@ -39157,9 +39311,6 @@
             <a:r>
               <a:rPr lang="en-US" sz="2000" b="1" dirty="0">
                 <a:ln/>
-                <a:solidFill>
-                  <a:schemeClr val="accent4"/>
-                </a:solidFill>
                 <a:latin typeface="Microsoft PhagsPa" panose="020B0502040204020203" pitchFamily="34" charset="0"/>
               </a:rPr>
               <a:t>Diana </a:t>
@@ -39167,18 +39318,12 @@
             <a:r>
               <a:rPr lang="en-US" sz="2000" b="1" dirty="0" smtClean="0">
                 <a:ln/>
-                <a:solidFill>
-                  <a:schemeClr val="accent4"/>
-                </a:solidFill>
                 <a:latin typeface="Microsoft PhagsPa" panose="020B0502040204020203" pitchFamily="34" charset="0"/>
               </a:rPr>
               <a:t>Gabaldon</a:t>
             </a:r>
             <a:endParaRPr lang="en-US" sz="2000" b="1" dirty="0">
               <a:ln/>
-              <a:solidFill>
-                <a:schemeClr val="accent4"/>
-              </a:solidFill>
             </a:endParaRPr>
           </a:p>
         </p:txBody>
@@ -39255,7 +39400,7 @@
               <a:rPr lang="en-US" sz="2800" b="1" dirty="0">
                 <a:ln/>
                 <a:solidFill>
-                  <a:schemeClr val="accent4"/>
+                  <a:schemeClr val="bg1"/>
                 </a:solidFill>
                 <a:latin typeface="Microsoft PhagsPa" panose="020B0502040204020203" pitchFamily="34" charset="0"/>
                 <a:ea typeface="Pacifico"/>
@@ -39286,9 +39431,33 @@
             <a:off x="5654713" y="204459"/>
             <a:ext cx="2128839" cy="1652981"/>
           </a:xfrm>
-          <a:prstGeom prst="rect">
+          <a:prstGeom prst="ellipse">
             <a:avLst/>
           </a:prstGeom>
+          <a:ln w="63500" cap="rnd">
+            <a:solidFill>
+              <a:srgbClr val="333333"/>
+            </a:solidFill>
+          </a:ln>
+          <a:effectLst>
+            <a:outerShdw blurRad="381000" dist="292100" dir="5400000" sx="-80000" sy="-18000" rotWithShape="0">
+              <a:srgbClr val="000000">
+                <a:alpha val="22000"/>
+              </a:srgbClr>
+            </a:outerShdw>
+          </a:effectLst>
+          <a:scene3d>
+            <a:camera prst="orthographicFront"/>
+            <a:lightRig rig="contrasting" dir="t">
+              <a:rot lat="0" lon="0" rev="3000000"/>
+            </a:lightRig>
+          </a:scene3d>
+          <a:sp3d contourW="7620">
+            <a:bevelT w="95250" h="31750"/>
+            <a:contourClr>
+              <a:srgbClr val="333333"/>
+            </a:contourClr>
+          </a:sp3d>
         </p:spPr>
       </p:pic>
       <p:pic>
@@ -39310,9 +39479,25 @@
             <a:off x="1655723" y="411825"/>
             <a:ext cx="3067050" cy="1238250"/>
           </a:xfrm>
-          <a:prstGeom prst="rect">
-            <a:avLst/>
+          <a:prstGeom prst="round2DiagRect">
+            <a:avLst>
+              <a:gd name="adj1" fmla="val 16667"/>
+              <a:gd name="adj2" fmla="val 0"/>
+            </a:avLst>
           </a:prstGeom>
+          <a:ln w="88900" cap="sq">
+            <a:solidFill>
+              <a:srgbClr val="FFFFFF"/>
+            </a:solidFill>
+            <a:miter lim="800000"/>
+          </a:ln>
+          <a:effectLst>
+            <a:outerShdw blurRad="254000" algn="tl" rotWithShape="0">
+              <a:srgbClr val="000000">
+                <a:alpha val="43000"/>
+              </a:srgbClr>
+            </a:outerShdw>
+          </a:effectLst>
         </p:spPr>
       </p:pic>
     </p:spTree>
@@ -40335,29 +40520,18 @@
         </p:blipFill>
         <p:spPr>
           <a:xfrm>
-            <a:off x="1204332" y="1232907"/>
+            <a:off x="1031488" y="1036107"/>
             <a:ext cx="7081024" cy="3713744"/>
           </a:xfrm>
-          <a:prstGeom prst="rect">
+          <a:prstGeom prst="ellipse">
             <a:avLst/>
           </a:prstGeom>
           <a:ln>
             <a:noFill/>
           </a:ln>
           <a:effectLst>
-            <a:reflection blurRad="12700" stA="30000" endPos="30000" dist="5000" dir="5400000" sy="-100000" algn="bl" rotWithShape="0"/>
+            <a:softEdge rad="112500"/>
           </a:effectLst>
-          <a:scene3d>
-            <a:camera prst="perspectiveContrastingLeftFacing">
-              <a:rot lat="300000" lon="19800000" rev="0"/>
-            </a:camera>
-            <a:lightRig rig="threePt" dir="t">
-              <a:rot lat="0" lon="0" rev="2700000"/>
-            </a:lightRig>
-          </a:scene3d>
-          <a:sp3d>
-            <a:bevelT w="63500" h="50800"/>
-          </a:sp3d>
         </p:spPr>
       </p:pic>
       <p:sp>
@@ -40368,7 +40542,7 @@
         </p:nvSpPr>
         <p:spPr>
           <a:xfrm>
-            <a:off x="977482" y="116470"/>
+            <a:off x="1031488" y="205110"/>
             <a:ext cx="7189036" cy="830997"/>
           </a:xfrm>
           <a:prstGeom prst="rect">
@@ -40407,9 +40581,7 @@
             <a:r>
               <a:rPr lang="en-US" sz="2400" dirty="0">
                 <a:solidFill>
-                  <a:schemeClr val="accent6">
-                    <a:lumMod val="50000"/>
-                  </a:schemeClr>
+                  <a:schemeClr val="bg1"/>
                 </a:solidFill>
                 <a:latin typeface="Arial Black" panose="020B0A04020102020204" pitchFamily="34" charset="0"/>
                 <a:ea typeface="Pacifico"/>
@@ -40420,9 +40592,7 @@
             <a:r>
               <a:rPr lang="en-US" sz="2400" dirty="0" smtClean="0">
                 <a:solidFill>
-                  <a:schemeClr val="accent6">
-                    <a:lumMod val="50000"/>
-                  </a:schemeClr>
+                  <a:schemeClr val="bg1"/>
                 </a:solidFill>
                 <a:latin typeface="Arial Black" panose="020B0A04020102020204" pitchFamily="34" charset="0"/>
                 <a:ea typeface="Pacifico"/>
@@ -40433,9 +40603,7 @@
             <a:r>
               <a:rPr lang="en-US" sz="2400" dirty="0">
                 <a:solidFill>
-                  <a:schemeClr val="accent6">
-                    <a:lumMod val="50000"/>
-                  </a:schemeClr>
+                  <a:schemeClr val="bg1"/>
                 </a:solidFill>
                 <a:latin typeface="Arial Black" panose="020B0A04020102020204" pitchFamily="34" charset="0"/>
                 <a:ea typeface="Pacifico"/>
@@ -40445,11 +40613,17 @@
             </a:r>
             <a:r>
               <a:rPr lang="en-US" dirty="0" smtClean="0">
+                <a:solidFill>
+                  <a:schemeClr val="bg1"/>
+                </a:solidFill>
                 <a:latin typeface="Arial Black" panose="020B0A04020102020204" pitchFamily="34" charset="0"/>
               </a:rPr>
               <a:t>.</a:t>
             </a:r>
             <a:endParaRPr lang="en-US" dirty="0">
+              <a:solidFill>
+                <a:schemeClr val="bg1"/>
+              </a:solidFill>
               <a:latin typeface="Arial Black" panose="020B0A04020102020204" pitchFamily="34" charset="0"/>
             </a:endParaRPr>
           </a:p>
@@ -40554,7 +40728,7 @@
             <a:r>
               <a:rPr lang="en-US" sz="2800" dirty="0">
                 <a:solidFill>
-                  <a:srgbClr val="FE6594"/>
+                  <a:schemeClr val="bg1"/>
                 </a:solidFill>
                 <a:latin typeface="Microsoft PhagsPa" panose="020B0502040204020203" pitchFamily="34" charset="0"/>
                 <a:ea typeface="Pacifico"/>
@@ -40590,7 +40764,7 @@
             <a:r>
               <a:rPr lang="en-US" sz="4400" dirty="0">
                 <a:solidFill>
-                  <a:srgbClr val="FE6594"/>
+                  <a:schemeClr val="bg1"/>
                 </a:solidFill>
                 <a:latin typeface="Microsoft PhagsPa" panose="020B0502040204020203" pitchFamily="34" charset="0"/>
                 <a:ea typeface="Pacifico"/>
@@ -40631,7 +40805,7 @@
             <a:r>
               <a:rPr lang="en-US" sz="2800" dirty="0">
                 <a:solidFill>
-                  <a:srgbClr val="FE6594"/>
+                  <a:schemeClr val="bg1"/>
                 </a:solidFill>
                 <a:latin typeface="Microsoft PhagsPa" panose="020B0502040204020203" pitchFamily="34" charset="0"/>
                 <a:ea typeface="Pacifico"/>
@@ -40642,7 +40816,7 @@
             <a:r>
               <a:rPr lang="en-US" sz="2800" dirty="0" smtClean="0">
                 <a:solidFill>
-                  <a:srgbClr val="FE6594"/>
+                  <a:schemeClr val="bg1"/>
                 </a:solidFill>
                 <a:latin typeface="Microsoft PhagsPa" panose="020B0502040204020203" pitchFamily="34" charset="0"/>
                 <a:ea typeface="Pacifico"/>
@@ -40661,7 +40835,7 @@
             <a:r>
               <a:rPr lang="en-US" sz="2800" dirty="0" smtClean="0">
                 <a:solidFill>
-                  <a:srgbClr val="FE6594"/>
+                  <a:schemeClr val="bg1"/>
                 </a:solidFill>
                 <a:latin typeface="Microsoft PhagsPa" panose="020B0502040204020203" pitchFamily="34" charset="0"/>
                 <a:ea typeface="Pacifico"/>
@@ -40671,7 +40845,7 @@
             </a:r>
             <a:endParaRPr lang="en-US" sz="2800" dirty="0">
               <a:solidFill>
-                <a:srgbClr val="FE6594"/>
+                <a:schemeClr val="bg1"/>
               </a:solidFill>
               <a:latin typeface="Microsoft PhagsPa" panose="020B0502040204020203" pitchFamily="34" charset="0"/>
               <a:ea typeface="Pacifico"/>
@@ -40688,7 +40862,7 @@
             <a:r>
               <a:rPr lang="en-US" sz="2800" dirty="0">
                 <a:solidFill>
-                  <a:srgbClr val="FE6594"/>
+                  <a:schemeClr val="bg1"/>
                 </a:solidFill>
                 <a:latin typeface="Microsoft PhagsPa" panose="020B0502040204020203" pitchFamily="34" charset="0"/>
                 <a:ea typeface="Pacifico"/>
@@ -40698,7 +40872,7 @@
             </a:r>
             <a:endParaRPr lang="en-US" sz="2800" dirty="0" smtClean="0">
               <a:solidFill>
-                <a:srgbClr val="FE6594"/>
+                <a:schemeClr val="bg1"/>
               </a:solidFill>
               <a:latin typeface="Microsoft PhagsPa" panose="020B0502040204020203" pitchFamily="34" charset="0"/>
               <a:ea typeface="Pacifico"/>
@@ -40731,7 +40905,7 @@
             <a:r>
               <a:rPr lang="en-US" sz="2000" dirty="0">
                 <a:solidFill>
-                  <a:srgbClr val="FE6594"/>
+                  <a:schemeClr val="bg1"/>
                 </a:solidFill>
                 <a:latin typeface="Microsoft PhagsPa" panose="020B0502040204020203" pitchFamily="34" charset="0"/>
                 <a:ea typeface="Pacifico"/>
@@ -40766,7 +40940,7 @@
             <a:r>
               <a:rPr lang="en-US" sz="2000" dirty="0">
                 <a:solidFill>
-                  <a:srgbClr val="FE6594"/>
+                  <a:schemeClr val="bg1"/>
                 </a:solidFill>
                 <a:latin typeface="Microsoft PhagsPa" panose="020B0502040204020203" pitchFamily="34" charset="0"/>
                 <a:ea typeface="Pacifico"/>
@@ -40777,7 +40951,7 @@
             <a:r>
               <a:rPr lang="en-US" sz="2000" dirty="0" smtClean="0">
                 <a:solidFill>
-                  <a:srgbClr val="FE6594"/>
+                  <a:schemeClr val="bg1"/>
                 </a:solidFill>
                 <a:latin typeface="Microsoft PhagsPa" panose="020B0502040204020203" pitchFamily="34" charset="0"/>
                 <a:ea typeface="Pacifico"/>
@@ -40787,7 +40961,7 @@
             </a:r>
             <a:endParaRPr lang="en-US" sz="2000" dirty="0">
               <a:solidFill>
-                <a:srgbClr val="FE6594"/>
+                <a:schemeClr val="bg1"/>
               </a:solidFill>
               <a:latin typeface="Microsoft PhagsPa" panose="020B0502040204020203" pitchFamily="34" charset="0"/>
               <a:ea typeface="Pacifico"/>
@@ -40988,7 +41162,7 @@
         <p:spPr>
           <a:xfrm>
             <a:off x="884096" y="3275733"/>
-            <a:ext cx="2113079" cy="523220"/>
+            <a:ext cx="1986441" cy="523220"/>
           </a:xfrm>
           <a:prstGeom prst="rect">
             <a:avLst/>
@@ -41002,7 +41176,7 @@
           <a:lstStyle/>
           <a:p>
             <a:r>
-              <a:rPr lang="en-US" sz="2800" b="1" dirty="0" smtClean="0">
+              <a:rPr lang="en-US" sz="2800" dirty="0" smtClean="0">
                 <a:ln w="9525">
                   <a:solidFill>
                     <a:schemeClr val="bg1"/>
@@ -41010,16 +41184,8 @@
                   <a:prstDash val="solid"/>
                 </a:ln>
                 <a:solidFill>
-                  <a:schemeClr val="accent5"/>
+                  <a:schemeClr val="bg1"/>
                 </a:solidFill>
-                <a:effectLst>
-                  <a:outerShdw blurRad="12700" dist="38100" dir="2700000" algn="tl" rotWithShape="0">
-                    <a:schemeClr val="accent5">
-                      <a:lumMod val="60000"/>
-                      <a:lumOff val="40000"/>
-                    </a:schemeClr>
-                  </a:outerShdw>
-                </a:effectLst>
                 <a:latin typeface="Microsoft PhagsPa" panose="020B0502040204020203" pitchFamily="34" charset="0"/>
                 <a:ea typeface="Pacifico"/>
                 <a:cs typeface="Pacifico"/>
@@ -41028,7 +41194,7 @@
             </a:r>
             <a:endParaRPr lang="en-US" sz="2800" dirty="0">
               <a:solidFill>
-                <a:srgbClr val="00B0F0"/>
+                <a:schemeClr val="bg1"/>
               </a:solidFill>
               <a:latin typeface="Microsoft PhagsPa" panose="020B0502040204020203" pitchFamily="34" charset="0"/>
               <a:ea typeface="Pacifico"/>
@@ -41512,7 +41678,7 @@
               <a:rPr lang="en-US" b="1" spc="50" dirty="0" smtClean="0">
                 <a:ln w="0"/>
                 <a:solidFill>
-                  <a:schemeClr val="bg2"/>
+                  <a:schemeClr val="accent2"/>
                 </a:solidFill>
                 <a:effectLst>
                   <a:innerShdw blurRad="63500" dist="50800" dir="13500000">
@@ -41526,9 +41692,7 @@
             </a:r>
             <a:endParaRPr lang="en-US" dirty="0">
               <a:solidFill>
-                <a:schemeClr val="accent5">
-                  <a:lumMod val="75000"/>
-                </a:schemeClr>
+                <a:schemeClr val="accent2"/>
               </a:solidFill>
             </a:endParaRPr>
           </a:p>
@@ -41560,7 +41724,7 @@
               <a:rPr lang="en-US" b="1" spc="50" dirty="0" smtClean="0">
                 <a:ln w="0"/>
                 <a:solidFill>
-                  <a:schemeClr val="bg2"/>
+                  <a:schemeClr val="accent2"/>
                 </a:solidFill>
                 <a:effectLst>
                   <a:innerShdw blurRad="63500" dist="50800" dir="13500000">
@@ -41574,9 +41738,7 @@
             </a:r>
             <a:endParaRPr lang="en-US" dirty="0">
               <a:solidFill>
-                <a:schemeClr val="accent5">
-                  <a:lumMod val="75000"/>
-                </a:schemeClr>
+                <a:schemeClr val="accent2"/>
               </a:solidFill>
             </a:endParaRPr>
           </a:p>
@@ -41681,7 +41843,7 @@
             <a:r>
               <a:rPr lang="en-US" sz="2800" dirty="0">
                 <a:solidFill>
-                  <a:srgbClr val="FE6594"/>
+                  <a:schemeClr val="bg1"/>
                 </a:solidFill>
                 <a:latin typeface="Microsoft PhagsPa" panose="020B0502040204020203" pitchFamily="34" charset="0"/>
                 <a:ea typeface="Pacifico"/>
@@ -41692,7 +41854,7 @@
             <a:r>
               <a:rPr lang="en-US" sz="2800" dirty="0" smtClean="0">
                 <a:solidFill>
-                  <a:srgbClr val="FE6594"/>
+                  <a:schemeClr val="bg1"/>
                 </a:solidFill>
                 <a:latin typeface="Microsoft PhagsPa" panose="020B0502040204020203" pitchFamily="34" charset="0"/>
                 <a:ea typeface="Pacifico"/>
@@ -41703,7 +41865,7 @@
             <a:r>
               <a:rPr lang="en-US" sz="2800" dirty="0">
                 <a:solidFill>
-                  <a:srgbClr val="FE6594"/>
+                  <a:schemeClr val="bg1"/>
                 </a:solidFill>
                 <a:latin typeface="Microsoft PhagsPa" panose="020B0502040204020203" pitchFamily="34" charset="0"/>
                 <a:ea typeface="Pacifico"/>
@@ -41714,7 +41876,7 @@
             <a:r>
               <a:rPr lang="en-US" sz="2800" dirty="0" smtClean="0">
                 <a:solidFill>
-                  <a:srgbClr val="FE6594"/>
+                  <a:schemeClr val="bg1"/>
                 </a:solidFill>
                 <a:latin typeface="Microsoft PhagsPa" panose="020B0502040204020203" pitchFamily="34" charset="0"/>
                 <a:ea typeface="Pacifico"/>
@@ -41724,7 +41886,7 @@
             </a:r>
             <a:endParaRPr lang="en-US" sz="2800" dirty="0">
               <a:solidFill>
-                <a:srgbClr val="FE6594"/>
+                <a:schemeClr val="bg1"/>
               </a:solidFill>
               <a:latin typeface="Microsoft PhagsPa" panose="020B0502040204020203" pitchFamily="34" charset="0"/>
               <a:ea typeface="Pacifico"/>
@@ -41758,7 +41920,7 @@
             <a:r>
               <a:rPr lang="en-US" sz="4400" dirty="0">
                 <a:solidFill>
-                  <a:srgbClr val="FE6594"/>
+                  <a:schemeClr val="bg1"/>
                 </a:solidFill>
                 <a:latin typeface="Microsoft PhagsPa" panose="020B0502040204020203" pitchFamily="34" charset="0"/>
                 <a:ea typeface="Pacifico"/>
@@ -41769,7 +41931,7 @@
             <a:r>
               <a:rPr lang="en-US" sz="4400" dirty="0" smtClean="0">
                 <a:solidFill>
-                  <a:srgbClr val="FE6594"/>
+                  <a:schemeClr val="bg1"/>
                 </a:solidFill>
                 <a:latin typeface="Microsoft PhagsPa" panose="020B0502040204020203" pitchFamily="34" charset="0"/>
                 <a:ea typeface="Pacifico"/>
@@ -41779,7 +41941,7 @@
             </a:r>
             <a:endParaRPr lang="en-US" sz="4400" dirty="0">
               <a:solidFill>
-                <a:srgbClr val="FE6594"/>
+                <a:schemeClr val="bg1"/>
               </a:solidFill>
               <a:latin typeface="Microsoft PhagsPa" panose="020B0502040204020203" pitchFamily="34" charset="0"/>
               <a:ea typeface="Pacifico"/>
@@ -41818,7 +41980,7 @@
             <a:r>
               <a:rPr lang="en-US" sz="2800" dirty="0">
                 <a:solidFill>
-                  <a:srgbClr val="FE6594"/>
+                  <a:schemeClr val="bg1"/>
                 </a:solidFill>
                 <a:latin typeface="Microsoft PhagsPa" panose="020B0502040204020203" pitchFamily="34" charset="0"/>
                 <a:ea typeface="Pacifico"/>
@@ -41829,7 +41991,7 @@
             <a:r>
               <a:rPr lang="en-US" sz="2800" dirty="0" smtClean="0">
                 <a:solidFill>
-                  <a:srgbClr val="FE6594"/>
+                  <a:schemeClr val="bg1"/>
                 </a:solidFill>
                 <a:latin typeface="Microsoft PhagsPa" panose="020B0502040204020203" pitchFamily="34" charset="0"/>
                 <a:ea typeface="Pacifico"/>
@@ -41864,7 +42026,7 @@
             <a:r>
               <a:rPr lang="en-US" sz="2000" dirty="0">
                 <a:solidFill>
-                  <a:srgbClr val="FE6594"/>
+                  <a:schemeClr val="bg1"/>
                 </a:solidFill>
                 <a:latin typeface="Microsoft PhagsPa" panose="020B0502040204020203" pitchFamily="34" charset="0"/>
                 <a:ea typeface="Pacifico"/>
@@ -41899,7 +42061,7 @@
             <a:r>
               <a:rPr lang="en-US" sz="2000" dirty="0">
                 <a:solidFill>
-                  <a:srgbClr val="FE6594"/>
+                  <a:schemeClr val="bg1"/>
                 </a:solidFill>
                 <a:latin typeface="Microsoft PhagsPa" panose="020B0502040204020203" pitchFamily="34" charset="0"/>
                 <a:ea typeface="Pacifico"/>
@@ -41910,7 +42072,7 @@
             <a:r>
               <a:rPr lang="en-US" sz="2000" dirty="0" smtClean="0">
                 <a:solidFill>
-                  <a:srgbClr val="FE6594"/>
+                  <a:schemeClr val="bg1"/>
                 </a:solidFill>
                 <a:latin typeface="Microsoft PhagsPa" panose="020B0502040204020203" pitchFamily="34" charset="0"/>
                 <a:ea typeface="Pacifico"/>
@@ -41920,7 +42082,7 @@
             </a:r>
             <a:endParaRPr lang="en-US" sz="2000" dirty="0">
               <a:solidFill>
-                <a:srgbClr val="FE6594"/>
+                <a:schemeClr val="bg1"/>
               </a:solidFill>
               <a:latin typeface="Microsoft PhagsPa" panose="020B0502040204020203" pitchFamily="34" charset="0"/>
               <a:ea typeface="Pacifico"/>

</xml_diff>